<commit_message>
Fixed Flohome to home
</commit_message>
<xml_diff>
--- a/Iteration 2 PowerPoint/Team 3 Iteration 2.pptx
+++ b/Iteration 2 PowerPoint/Team 3 Iteration 2.pptx
@@ -4794,7 +4794,32 @@
           <a:p>
             <a:r>
               <a:rPr lang="en-US" dirty="0" smtClean="0"/>
-              <a:t>Reports Design Layout</a:t>
+              <a:t>Slipped from Increment 2</a:t>
+            </a:r>
+          </a:p>
+          <a:p>
+            <a:pPr lvl="1"/>
+            <a:r>
+              <a:rPr lang="en-US" dirty="0" smtClean="0"/>
+              <a:t>Work Recording</a:t>
+            </a:r>
+          </a:p>
+          <a:p>
+            <a:pPr lvl="1"/>
+            <a:r>
+              <a:rPr lang="en-US" smtClean="0"/>
+              <a:t>Work Management</a:t>
+            </a:r>
+            <a:endParaRPr lang="en-US" dirty="0" smtClean="0"/>
+          </a:p>
+          <a:p>
+            <a:r>
+              <a:rPr lang="en-US" dirty="0" smtClean="0"/>
+              <a:t>Reports </a:t>
+            </a:r>
+            <a:r>
+              <a:rPr lang="en-US" dirty="0" smtClean="0"/>
+              <a:t>Design Layout</a:t>
             </a:r>
           </a:p>
           <a:p>
@@ -4916,8 +4941,30 @@
           </a:p>
           <a:p>
             <a:r>
+              <a:rPr lang="en-US" dirty="0"/>
+              <a:t>Project Plan</a:t>
+            </a:r>
+          </a:p>
+          <a:p>
+            <a:r>
+              <a:rPr lang="en-US" dirty="0"/>
+              <a:t>Increment 2</a:t>
+            </a:r>
+          </a:p>
+          <a:p>
+            <a:r>
+              <a:rPr lang="en-US" dirty="0"/>
+              <a:t>Prototype Demo</a:t>
+            </a:r>
+          </a:p>
+          <a:p>
+            <a:r>
               <a:rPr lang="en-US" dirty="0" smtClean="0"/>
-              <a:t>Joel Test</a:t>
+              <a:t>Joel </a:t>
+            </a:r>
+            <a:r>
+              <a:rPr lang="en-US" dirty="0" smtClean="0"/>
+              <a:t>Test</a:t>
             </a:r>
           </a:p>
           <a:p>
@@ -4929,25 +4976,11 @@
           <a:p>
             <a:r>
               <a:rPr lang="en-US" dirty="0" smtClean="0"/>
-              <a:t>Project Plan</a:t>
+              <a:t>Bug </a:t>
             </a:r>
-          </a:p>
-          <a:p>
             <a:r>
               <a:rPr lang="en-US" dirty="0" smtClean="0"/>
-              <a:t>Increment 2</a:t>
-            </a:r>
-          </a:p>
-          <a:p>
-            <a:r>
-              <a:rPr lang="en-US" dirty="0" smtClean="0"/>
-              <a:t>Prototype Demo</a:t>
-            </a:r>
-          </a:p>
-          <a:p>
-            <a:r>
-              <a:rPr lang="en-US" dirty="0" smtClean="0"/>
-              <a:t>Bug Tracking</a:t>
+              <a:t>Tracking</a:t>
             </a:r>
           </a:p>
           <a:p>

</xml_diff>